<commit_message>
Update ICU Admissions Capstone.pptx
updating charts
</commit_message>
<xml_diff>
--- a/ICU Admissions Capstone.pptx
+++ b/ICU Admissions Capstone.pptx
@@ -7757,7 +7757,7 @@
           <a:p>
             <a:fld id="{7B97C6B7-F63D-48F8-8C65-A57506B0F13B}" type="datetimeFigureOut">
               <a:rPr lang="en-US" smtClean="0"/>
-              <a:t>9/21/2024</a:t>
+              <a:t>9/22/2024</a:t>
             </a:fld>
             <a:endParaRPr lang="en-US" dirty="0"/>
           </a:p>
@@ -7934,7 +7934,7 @@
           <a:p>
             <a:fld id="{AC09A0FA-2191-4F92-A1E4-6EB4598AC4EC}" type="datetimeFigureOut">
               <a:rPr lang="en-US" smtClean="0"/>
-              <a:t>9/21/2024</a:t>
+              <a:t>9/22/2024</a:t>
             </a:fld>
             <a:endParaRPr lang="en-US" dirty="0"/>
           </a:p>
@@ -14848,30 +14848,305 @@
       </p:grpSpPr>
       <p:sp>
         <p:nvSpPr>
-          <p:cNvPr id="8" name="Title 7">
+          <p:cNvPr id="15" name="Rectangle 14">
             <a:extLst>
               <a:ext uri="{FF2B5EF4-FFF2-40B4-BE49-F238E27FC236}">
-                <a16:creationId xmlns:a16="http://schemas.microsoft.com/office/drawing/2014/main" id="{479F0267-9D1C-BDA9-A152-B01CD379FC92}"/>
+                <a16:creationId xmlns:a16="http://schemas.microsoft.com/office/drawing/2014/main" id="{E6C8E6EB-4C59-429B-97E4-72A058CFC4FB}"/>
+              </a:ext>
+              <a:ext uri="{C183D7F6-B498-43B3-948B-1728B52AA6E4}">
+                <adec:decorative xmlns:adec="http://schemas.microsoft.com/office/drawing/2017/decorative" val="1"/>
               </a:ext>
             </a:extLst>
           </p:cNvPr>
           <p:cNvSpPr>
-            <a:spLocks noGrp="1"/>
+            <a:spLocks noGrp="1" noRot="1" noChangeAspect="1" noMove="1" noResize="1" noEditPoints="1" noAdjustHandles="1" noChangeArrowheads="1" noChangeShapeType="1" noTextEdit="1"/>
           </p:cNvSpPr>
           <p:nvPr>
-            <p:ph type="ctrTitle"/>
+            <p:extLst>
+              <p:ext uri="{386F3935-93C4-4BCD-93E2-E3B085C9AB24}">
+                <p16:designElem xmlns:p16="http://schemas.microsoft.com/office/powerpoint/2015/main" val="1"/>
+              </p:ext>
+            </p:extLst>
           </p:nvPr>
         </p:nvSpPr>
-        <p:spPr/>
+        <p:spPr>
+          <a:xfrm>
+            <a:off x="446534" y="457200"/>
+            <a:ext cx="3703320" cy="94997"/>
+          </a:xfrm>
+          <a:prstGeom prst="rect">
+            <a:avLst/>
+          </a:prstGeom>
+          <a:solidFill>
+            <a:srgbClr val="465359"/>
+          </a:solidFill>
+          <a:ln>
+            <a:noFill/>
+          </a:ln>
+          <a:effectLst/>
+        </p:spPr>
+        <p:style>
+          <a:lnRef idx="1">
+            <a:schemeClr val="accent1"/>
+          </a:lnRef>
+          <a:fillRef idx="3">
+            <a:schemeClr val="accent1"/>
+          </a:fillRef>
+          <a:effectRef idx="2">
+            <a:schemeClr val="accent1"/>
+          </a:effectRef>
+          <a:fontRef idx="minor">
+            <a:schemeClr val="lt1"/>
+          </a:fontRef>
+        </p:style>
         <p:txBody>
           <a:bodyPr/>
           <a:lstStyle/>
           <a:p>
-            <a:r>
-              <a:rPr lang="en" sz="2800" dirty="0"/>
-              <a:t>ICU Admissions: Predictive Analysis of COVID-19 Patients</a:t>
-            </a:r>
-            <a:endParaRPr lang="en-US" dirty="0"/>
+            <a:endParaRPr lang="en-US"/>
+          </a:p>
+        </p:txBody>
+      </p:sp>
+      <p:sp>
+        <p:nvSpPr>
+          <p:cNvPr id="17" name="Rectangle 16">
+            <a:extLst>
+              <a:ext uri="{FF2B5EF4-FFF2-40B4-BE49-F238E27FC236}">
+                <a16:creationId xmlns:a16="http://schemas.microsoft.com/office/drawing/2014/main" id="{B5B90362-AFCC-46A9-B41C-A257A8C5B314}"/>
+              </a:ext>
+              <a:ext uri="{C183D7F6-B498-43B3-948B-1728B52AA6E4}">
+                <adec:decorative xmlns:adec="http://schemas.microsoft.com/office/drawing/2017/decorative" val="1"/>
+              </a:ext>
+            </a:extLst>
+          </p:cNvPr>
+          <p:cNvSpPr>
+            <a:spLocks noGrp="1" noRot="1" noChangeAspect="1" noMove="1" noResize="1" noEditPoints="1" noAdjustHandles="1" noChangeArrowheads="1" noChangeShapeType="1" noTextEdit="1"/>
+          </p:cNvSpPr>
+          <p:nvPr>
+            <p:extLst>
+              <p:ext uri="{386F3935-93C4-4BCD-93E2-E3B085C9AB24}">
+                <p16:designElem xmlns:p16="http://schemas.microsoft.com/office/powerpoint/2015/main" val="1"/>
+              </p:ext>
+            </p:extLst>
+          </p:nvPr>
+        </p:nvSpPr>
+        <p:spPr>
+          <a:xfrm>
+            <a:off x="8042147" y="453643"/>
+            <a:ext cx="3703320" cy="98554"/>
+          </a:xfrm>
+          <a:prstGeom prst="rect">
+            <a:avLst/>
+          </a:prstGeom>
+          <a:solidFill>
+            <a:srgbClr val="969FA7"/>
+          </a:solidFill>
+          <a:ln>
+            <a:noFill/>
+          </a:ln>
+          <a:effectLst/>
+        </p:spPr>
+        <p:style>
+          <a:lnRef idx="1">
+            <a:schemeClr val="accent1"/>
+          </a:lnRef>
+          <a:fillRef idx="3">
+            <a:schemeClr val="accent1"/>
+          </a:fillRef>
+          <a:effectRef idx="2">
+            <a:schemeClr val="accent1"/>
+          </a:effectRef>
+          <a:fontRef idx="minor">
+            <a:schemeClr val="lt1"/>
+          </a:fontRef>
+        </p:style>
+        <p:txBody>
+          <a:bodyPr/>
+          <a:lstStyle/>
+          <a:p>
+            <a:endParaRPr lang="en-US"/>
+          </a:p>
+        </p:txBody>
+      </p:sp>
+      <p:sp>
+        <p:nvSpPr>
+          <p:cNvPr id="19" name="Rectangle 18">
+            <a:extLst>
+              <a:ext uri="{FF2B5EF4-FFF2-40B4-BE49-F238E27FC236}">
+                <a16:creationId xmlns:a16="http://schemas.microsoft.com/office/drawing/2014/main" id="{F71EF7F1-38BA-471D-8CD4-2A9AE8E35527}"/>
+              </a:ext>
+              <a:ext uri="{C183D7F6-B498-43B3-948B-1728B52AA6E4}">
+                <adec:decorative xmlns:adec="http://schemas.microsoft.com/office/drawing/2017/decorative" val="1"/>
+              </a:ext>
+            </a:extLst>
+          </p:cNvPr>
+          <p:cNvSpPr>
+            <a:spLocks noGrp="1" noRot="1" noChangeAspect="1" noMove="1" noResize="1" noEditPoints="1" noAdjustHandles="1" noChangeArrowheads="1" noChangeShapeType="1" noTextEdit="1"/>
+          </p:cNvSpPr>
+          <p:nvPr>
+            <p:extLst>
+              <p:ext uri="{386F3935-93C4-4BCD-93E2-E3B085C9AB24}">
+                <p16:designElem xmlns:p16="http://schemas.microsoft.com/office/powerpoint/2015/main" val="1"/>
+              </p:ext>
+            </p:extLst>
+          </p:nvPr>
+        </p:nvSpPr>
+        <p:spPr>
+          <a:xfrm>
+            <a:off x="4241830" y="457200"/>
+            <a:ext cx="3703320" cy="91440"/>
+          </a:xfrm>
+          <a:prstGeom prst="rect">
+            <a:avLst/>
+          </a:prstGeom>
+          <a:solidFill>
+            <a:schemeClr val="accent1"/>
+          </a:solidFill>
+          <a:ln>
+            <a:noFill/>
+          </a:ln>
+          <a:effectLst/>
+        </p:spPr>
+        <p:style>
+          <a:lnRef idx="1">
+            <a:schemeClr val="accent1"/>
+          </a:lnRef>
+          <a:fillRef idx="3">
+            <a:schemeClr val="accent1"/>
+          </a:fillRef>
+          <a:effectRef idx="2">
+            <a:schemeClr val="accent1"/>
+          </a:effectRef>
+          <a:fontRef idx="minor">
+            <a:schemeClr val="lt1"/>
+          </a:fontRef>
+        </p:style>
+        <p:txBody>
+          <a:bodyPr/>
+          <a:lstStyle/>
+          <a:p>
+            <a:endParaRPr lang="en-US"/>
+          </a:p>
+        </p:txBody>
+      </p:sp>
+      <p:sp>
+        <p:nvSpPr>
+          <p:cNvPr id="21" name="Rectangle 20">
+            <a:extLst>
+              <a:ext uri="{FF2B5EF4-FFF2-40B4-BE49-F238E27FC236}">
+                <a16:creationId xmlns:a16="http://schemas.microsoft.com/office/drawing/2014/main" id="{C0524398-BFB4-4C4A-8317-83B8729F9B26}"/>
+              </a:ext>
+              <a:ext uri="{C183D7F6-B498-43B3-948B-1728B52AA6E4}">
+                <adec:decorative xmlns:adec="http://schemas.microsoft.com/office/drawing/2017/decorative" val="1"/>
+              </a:ext>
+            </a:extLst>
+          </p:cNvPr>
+          <p:cNvSpPr>
+            <a:spLocks noGrp="1" noRot="1" noChangeAspect="1" noMove="1" noResize="1" noEditPoints="1" noAdjustHandles="1" noChangeArrowheads="1" noChangeShapeType="1" noTextEdit="1"/>
+          </p:cNvSpPr>
+          <p:nvPr>
+            <p:extLst>
+              <p:ext uri="{386F3935-93C4-4BCD-93E2-E3B085C9AB24}">
+                <p16:designElem xmlns:p16="http://schemas.microsoft.com/office/powerpoint/2015/main" val="1"/>
+              </p:ext>
+            </p:extLst>
+          </p:nvPr>
+        </p:nvSpPr>
+        <p:spPr>
+          <a:xfrm>
+            <a:off x="446534" y="3085764"/>
+            <a:ext cx="11298932" cy="3338149"/>
+          </a:xfrm>
+          <a:prstGeom prst="rect">
+            <a:avLst/>
+          </a:prstGeom>
+          <a:solidFill>
+            <a:srgbClr val="465359"/>
+          </a:solidFill>
+          <a:ln>
+            <a:noFill/>
+          </a:ln>
+          <a:effectLst/>
+        </p:spPr>
+        <p:style>
+          <a:lnRef idx="1">
+            <a:schemeClr val="accent1"/>
+          </a:lnRef>
+          <a:fillRef idx="3">
+            <a:schemeClr val="accent1"/>
+          </a:fillRef>
+          <a:effectRef idx="2">
+            <a:schemeClr val="accent1"/>
+          </a:effectRef>
+          <a:fontRef idx="minor">
+            <a:schemeClr val="lt1"/>
+          </a:fontRef>
+        </p:style>
+        <p:txBody>
+          <a:bodyPr/>
+          <a:lstStyle/>
+          <a:p>
+            <a:endParaRPr lang="en-US"/>
+          </a:p>
+        </p:txBody>
+      </p:sp>
+      <p:sp useBgFill="1">
+        <p:nvSpPr>
+          <p:cNvPr id="23" name="Rectangle 22">
+            <a:extLst>
+              <a:ext uri="{FF2B5EF4-FFF2-40B4-BE49-F238E27FC236}">
+                <a16:creationId xmlns:a16="http://schemas.microsoft.com/office/drawing/2014/main" id="{2FB82883-1DC0-4BE1-A607-009095F3355A}"/>
+              </a:ext>
+              <a:ext uri="{C183D7F6-B498-43B3-948B-1728B52AA6E4}">
+                <adec:decorative xmlns:adec="http://schemas.microsoft.com/office/drawing/2017/decorative" val="1"/>
+              </a:ext>
+            </a:extLst>
+          </p:cNvPr>
+          <p:cNvSpPr>
+            <a:spLocks noGrp="1" noRot="1" noChangeAspect="1" noMove="1" noResize="1" noEditPoints="1" noAdjustHandles="1" noChangeArrowheads="1" noChangeShapeType="1" noTextEdit="1"/>
+          </p:cNvSpPr>
+          <p:nvPr>
+            <p:extLst>
+              <p:ext uri="{386F3935-93C4-4BCD-93E2-E3B085C9AB24}">
+                <p16:designElem xmlns:p16="http://schemas.microsoft.com/office/powerpoint/2015/main" val="1"/>
+              </p:ext>
+            </p:extLst>
+          </p:nvPr>
+        </p:nvSpPr>
+        <p:spPr>
+          <a:xfrm>
+            <a:off x="0" y="0"/>
+            <a:ext cx="12192000" cy="6858000"/>
+          </a:xfrm>
+          <a:prstGeom prst="rect">
+            <a:avLst/>
+          </a:prstGeom>
+          <a:ln>
+            <a:noFill/>
+          </a:ln>
+        </p:spPr>
+        <p:style>
+          <a:lnRef idx="2">
+            <a:schemeClr val="accent1">
+              <a:shade val="50000"/>
+            </a:schemeClr>
+          </a:lnRef>
+          <a:fillRef idx="1">
+            <a:schemeClr val="accent1"/>
+          </a:fillRef>
+          <a:effectRef idx="0">
+            <a:schemeClr val="accent1"/>
+          </a:effectRef>
+          <a:fontRef idx="minor">
+            <a:schemeClr val="lt1"/>
+          </a:fontRef>
+        </p:style>
+        <p:txBody>
+          <a:bodyPr rtlCol="0" anchor="ctr"/>
+          <a:lstStyle/>
+          <a:p>
+            <a:pPr algn="ctr"/>
+            <a:endParaRPr lang="en-US"/>
           </a:p>
         </p:txBody>
       </p:sp>
@@ -14888,16 +15163,189 @@
             <a:picLocks noGrp="1" noChangeAspect="1"/>
           </p:cNvPicPr>
           <p:nvPr>
-            <p:ph type="pic" sz="quarter" idx="13"/>
+            <p:ph type="pic" sz="quarter" idx="4294967295"/>
           </p:nvPr>
         </p:nvPicPr>
         <p:blipFill rotWithShape="1">
           <a:blip r:embed="rId3"/>
-          <a:srcRect t="28164" b="28164"/>
+          <a:srcRect t="15730"/>
           <a:stretch/>
         </p:blipFill>
-        <p:spPr/>
+        <p:spPr>
+          <a:xfrm>
+            <a:off x="20" y="10"/>
+            <a:ext cx="12191980" cy="6857990"/>
+          </a:xfrm>
+          <a:prstGeom prst="rect">
+            <a:avLst/>
+          </a:prstGeom>
+        </p:spPr>
       </p:pic>
+      <p:sp>
+        <p:nvSpPr>
+          <p:cNvPr id="25" name="Rectangle 24">
+            <a:extLst>
+              <a:ext uri="{FF2B5EF4-FFF2-40B4-BE49-F238E27FC236}">
+                <a16:creationId xmlns:a16="http://schemas.microsoft.com/office/drawing/2014/main" id="{9FA98EAA-A866-4C95-A2A8-44E46FBAD5A0}"/>
+              </a:ext>
+              <a:ext uri="{C183D7F6-B498-43B3-948B-1728B52AA6E4}">
+                <adec:decorative xmlns:adec="http://schemas.microsoft.com/office/drawing/2017/decorative" val="1"/>
+              </a:ext>
+            </a:extLst>
+          </p:cNvPr>
+          <p:cNvSpPr>
+            <a:spLocks noGrp="1" noRot="1" noChangeAspect="1" noMove="1" noResize="1" noEditPoints="1" noAdjustHandles="1" noChangeArrowheads="1" noChangeShapeType="1" noTextEdit="1"/>
+          </p:cNvSpPr>
+          <p:nvPr>
+            <p:extLst>
+              <p:ext uri="{386F3935-93C4-4BCD-93E2-E3B085C9AB24}">
+                <p16:designElem xmlns:p16="http://schemas.microsoft.com/office/powerpoint/2015/main" val="1"/>
+              </p:ext>
+            </p:extLst>
+          </p:nvPr>
+        </p:nvSpPr>
+        <p:spPr>
+          <a:xfrm rot="10800000">
+            <a:off x="-3" y="4530071"/>
+            <a:ext cx="12191999" cy="2327926"/>
+          </a:xfrm>
+          <a:prstGeom prst="rect">
+            <a:avLst/>
+          </a:prstGeom>
+          <a:gradFill flip="none" rotWithShape="1">
+            <a:gsLst>
+              <a:gs pos="56000">
+                <a:schemeClr val="tx1">
+                  <a:alpha val="39000"/>
+                </a:schemeClr>
+              </a:gs>
+              <a:gs pos="100000">
+                <a:schemeClr val="tx1">
+                  <a:alpha val="80000"/>
+                </a:schemeClr>
+              </a:gs>
+              <a:gs pos="0">
+                <a:schemeClr val="tx1">
+                  <a:alpha val="0"/>
+                </a:schemeClr>
+              </a:gs>
+            </a:gsLst>
+            <a:lin ang="16200000" scaled="1"/>
+            <a:tileRect/>
+          </a:gradFill>
+          <a:ln>
+            <a:noFill/>
+          </a:ln>
+        </p:spPr>
+        <p:style>
+          <a:lnRef idx="2">
+            <a:schemeClr val="accent1">
+              <a:shade val="50000"/>
+            </a:schemeClr>
+          </a:lnRef>
+          <a:fillRef idx="1">
+            <a:schemeClr val="accent1"/>
+          </a:fillRef>
+          <a:effectRef idx="0">
+            <a:schemeClr val="accent1"/>
+          </a:effectRef>
+          <a:fontRef idx="minor">
+            <a:schemeClr val="lt1"/>
+          </a:fontRef>
+        </p:style>
+        <p:txBody>
+          <a:bodyPr rtlCol="0" anchor="ctr"/>
+          <a:lstStyle/>
+          <a:p>
+            <a:pPr algn="ctr"/>
+            <a:endParaRPr lang="en-US"/>
+          </a:p>
+        </p:txBody>
+      </p:sp>
+      <p:sp>
+        <p:nvSpPr>
+          <p:cNvPr id="8" name="Title 7">
+            <a:extLst>
+              <a:ext uri="{FF2B5EF4-FFF2-40B4-BE49-F238E27FC236}">
+                <a16:creationId xmlns:a16="http://schemas.microsoft.com/office/drawing/2014/main" id="{479F0267-9D1C-BDA9-A152-B01CD379FC92}"/>
+              </a:ext>
+            </a:extLst>
+          </p:cNvPr>
+          <p:cNvSpPr>
+            <a:spLocks noGrp="1"/>
+          </p:cNvSpPr>
+          <p:nvPr>
+            <p:ph type="title"/>
+          </p:nvPr>
+        </p:nvSpPr>
+        <p:spPr>
+          <a:xfrm>
+            <a:off x="2103121" y="4727173"/>
+            <a:ext cx="7985759" cy="868823"/>
+          </a:xfrm>
+        </p:spPr>
+        <p:txBody>
+          <a:bodyPr vert="horz" lIns="91440" tIns="45720" rIns="91440" bIns="45720" rtlCol="0" anchor="b">
+            <a:normAutofit/>
+          </a:bodyPr>
+          <a:lstStyle/>
+          <a:p>
+            <a:pPr algn="ctr">
+              <a:lnSpc>
+                <a:spcPct val="90000"/>
+              </a:lnSpc>
+            </a:pPr>
+            <a:r>
+              <a:rPr lang="en-US" sz="2800">
+                <a:solidFill>
+                  <a:schemeClr val="bg1"/>
+                </a:solidFill>
+              </a:rPr>
+              <a:t>ICU Admissions: Predictive Analysis of COVID-19 Patients</a:t>
+            </a:r>
+          </a:p>
+        </p:txBody>
+      </p:sp>
+      <p:sp>
+        <p:nvSpPr>
+          <p:cNvPr id="2" name="Text Placeholder 1">
+            <a:extLst>
+              <a:ext uri="{FF2B5EF4-FFF2-40B4-BE49-F238E27FC236}">
+                <a16:creationId xmlns:a16="http://schemas.microsoft.com/office/drawing/2014/main" id="{6C55720A-1A61-0250-D848-62B0FFF7011A}"/>
+              </a:ext>
+            </a:extLst>
+          </p:cNvPr>
+          <p:cNvSpPr>
+            <a:spLocks noGrp="1"/>
+          </p:cNvSpPr>
+          <p:nvPr>
+            <p:ph type="body" idx="1"/>
+          </p:nvPr>
+        </p:nvSpPr>
+        <p:spPr>
+          <a:xfrm>
+            <a:off x="2615738" y="5680637"/>
+            <a:ext cx="6960524" cy="598516"/>
+          </a:xfrm>
+        </p:spPr>
+        <p:txBody>
+          <a:bodyPr vert="horz" lIns="91440" tIns="45720" rIns="91440" bIns="45720" rtlCol="0" anchor="t">
+            <a:normAutofit/>
+          </a:bodyPr>
+          <a:lstStyle/>
+          <a:p>
+            <a:pPr algn="ctr"/>
+            <a:r>
+              <a:rPr lang="en-US" sz="2000" dirty="0">
+                <a:solidFill>
+                  <a:schemeClr val="bg1"/>
+                </a:solidFill>
+              </a:rPr>
+              <a:t>By Angelica butler</a:t>
+            </a:r>
+          </a:p>
+        </p:txBody>
+      </p:sp>
     </p:spTree>
     <p:extLst>
       <p:ext uri="{BB962C8B-B14F-4D97-AF65-F5344CB8AC3E}">
@@ -14985,14 +15433,14 @@
         </p:spPr>
         <p:txBody>
           <a:bodyPr>
-            <a:normAutofit lnSpcReduction="10000"/>
+            <a:normAutofit fontScale="85000" lnSpcReduction="10000"/>
           </a:bodyPr>
           <a:lstStyle/>
           <a:p>
             <a:pPr algn="ctr"/>
             <a:r>
               <a:rPr lang="en-US" sz="2000" b="1" i="1" dirty="0"/>
-              <a:t>Identifying if a patients needs to be admitted in ICU sooner a key in alleviating a lot of the challenges critical care faces.</a:t>
+              <a:t>Identifying whether a patient needs to be admitted to the ICU sooner is key to alleviating many of the challenges critical care faces.</a:t>
             </a:r>
           </a:p>
           <a:p>
@@ -15030,7 +15478,7 @@
           <a:p>
             <a:r>
               <a:rPr lang="en-US" dirty="0"/>
-              <a:t>From the data study, a predictive analysis was performed using machine learning algorithms called Random Forest.</a:t>
+              <a:t>A predictive analysis was performed using machine learning algorithms called Random Forest based on the data study.</a:t>
             </a:r>
           </a:p>
           <a:p>
@@ -15039,7 +15487,7 @@
           <a:p>
             <a:r>
               <a:rPr lang="en-US" dirty="0"/>
-              <a:t>The model that was create sole purpose is to predictive rather or not a patient should be admitted into ICU. The model parameters are curated to perform this analysis more effective and efficient then any manual analysis could do.</a:t>
+              <a:t>The model's sole purpose is to predict whether a patient should be admitted into the ICU. The model parameters are curated to perform this analysis more effectively and efficiently than any manual analysis could.</a:t>
             </a:r>
           </a:p>
           <a:p>
@@ -15609,7 +16057,7 @@
             </a:pPr>
             <a:r>
               <a:rPr lang="en-US" dirty="0"/>
-              <a:t>The model was able to decipher between useful data and data that is not as important when deciding if a patient needs to be admitted into ICU. Below is a high-level overview of the optimization efforts that was used to build the model.</a:t>
+              <a:t>The model was able to decipher between useful data and data that is not as important when deciding if a patient needs to be admitted into the ICU. Below is a high-level overview of the optimization efforts that were used to build the model.</a:t>
             </a:r>
           </a:p>
         </p:txBody>
@@ -15944,13 +16392,17 @@
             </a:pPr>
             <a:r>
               <a:rPr lang="en-US" sz="2000" dirty="0"/>
-              <a:t>Benefits of implementing this model into our system will be beneficial.</a:t>
+              <a:t>Benefits of implementing this model into our system </a:t>
             </a:r>
           </a:p>
           <a:p>
+            <a:pPr>
+              <a:buFont typeface="Wingdings" panose="05000000000000000000" pitchFamily="2" charset="2"/>
+              <a:buChar char="§"/>
+            </a:pPr>
             <a:r>
               <a:rPr lang="en-US" dirty="0"/>
-              <a:t>Reducing Healthcare Cost: Incorrect admissions into ICU is expensive.</a:t>
+              <a:t>R	educing Healthcare Cost: Incorrect admissions into ICU is expensive.</a:t>
             </a:r>
           </a:p>
           <a:p>
@@ -17853,11 +18305,10 @@
               <a:lnSpc>
                 <a:spcPct val="90000"/>
               </a:lnSpc>
-              <a:buFont typeface="Wingdings 2" panose="05020102010507070707" pitchFamily="18" charset="2"/>
-              <a:buChar char=""/>
+              <a:buNone/>
             </a:pPr>
             <a:r>
-              <a:rPr lang="en-US" sz="1500">
+              <a:rPr lang="en-US" sz="1500" dirty="0">
                 <a:solidFill>
                   <a:srgbClr val="FFFFFF"/>
                 </a:solidFill>
@@ -17874,7 +18325,7 @@
               <a:buChar char=""/>
             </a:pPr>
             <a:r>
-              <a:rPr lang="en-US" sz="1500">
+              <a:rPr lang="en-US" sz="1500" dirty="0">
                 <a:solidFill>
                   <a:srgbClr val="FFFFFF"/>
                 </a:solidFill>
@@ -17891,7 +18342,7 @@
               <a:buChar char=""/>
             </a:pPr>
             <a:r>
-              <a:rPr lang="en-US" sz="1500">
+              <a:rPr lang="en-US" sz="1500" dirty="0">
                 <a:solidFill>
                   <a:srgbClr val="FFFFFF"/>
                 </a:solidFill>
@@ -17908,7 +18359,7 @@
               <a:buChar char=""/>
             </a:pPr>
             <a:r>
-              <a:rPr lang="en-US" sz="1500">
+              <a:rPr lang="en-US" sz="1500" dirty="0">
                 <a:solidFill>
                   <a:srgbClr val="FFFFFF"/>
                 </a:solidFill>
@@ -17925,7 +18376,7 @@
               <a:buChar char=""/>
             </a:pPr>
             <a:r>
-              <a:rPr lang="en-US" sz="1500">
+              <a:rPr lang="en-US" sz="1500" dirty="0">
                 <a:solidFill>
                   <a:srgbClr val="FFFFFF"/>
                 </a:solidFill>
@@ -18199,13 +18650,16 @@
           <a:p>
             <a:r>
               <a:rPr lang="en-US" dirty="0"/>
-              <a:t>Data from COVID-19 patients was gather from Sirio Labenes to and used in our </a:t>
+              <a:t>Data from COVID-19 patients was gathered from Sirio </a:t>
             </a:r>
             <a:r>
               <a:rPr lang="en-US" dirty="0" err="1"/>
-              <a:t>analyis</a:t>
+              <a:t>Labenes</a:t>
             </a:r>
-            <a:endParaRPr lang="en-US" dirty="0"/>
+            <a:r>
+              <a:rPr lang="en-US" dirty="0"/>
+              <a:t> and used in our analysis.</a:t>
+            </a:r>
           </a:p>
           <a:p>
             <a:r>
@@ -18369,7 +18823,7 @@
             </a:pPr>
             <a:r>
               <a:rPr lang="en-US" dirty="0"/>
-              <a:t>To develop a predictive model that identifies COVID-19 patients likely to require ICU admission, sooner in their treatment.</a:t>
+              <a:t>The study aims to develop a predictive model that identifies COVID-19 patients who are likely to require ICU admission sooner in their treatment.</a:t>
             </a:r>
           </a:p>
         </p:txBody>
@@ -18601,13 +19055,13 @@
           <a:p>
             <a:r>
               <a:rPr lang="en-US" dirty="0"/>
-              <a:t>In this chart you are able to distinguished the time window where the patients that was admitted into ICU. </a:t>
+              <a:t>In this chart you can distinguished the time window where the patients that was admitted into ICU. </a:t>
             </a:r>
           </a:p>
           <a:p>
             <a:r>
               <a:rPr lang="en-US" dirty="0"/>
-              <a:t>In most industries especially healthcare, time a lot is a very expensive and important resource. </a:t>
+              <a:t>In most industries especially healthcare, time alone is a very expensive and important resource. </a:t>
             </a:r>
           </a:p>
         </p:txBody>
@@ -19633,15 +20087,6 @@
 </file>
 
 <file path=customXml/item2.xml><?xml version="1.0" encoding="utf-8"?>
-<?mso-contentType ?>
-<FormTemplates xmlns="http://schemas.microsoft.com/sharepoint/v3/contenttype/forms">
-  <Display>DocumentLibraryForm</Display>
-  <Edit>DocumentLibraryForm</Edit>
-  <New>DocumentLibraryForm</New>
-</FormTemplates>
-</file>
-
-<file path=customXml/item3.xml><?xml version="1.0" encoding="utf-8"?>
 <ct:contentTypeSchema xmlns:ct="http://schemas.microsoft.com/office/2006/metadata/contentType" xmlns:ma="http://schemas.microsoft.com/office/2006/metadata/properties/metaAttributes" ct:_="" ma:_="" ma:contentTypeName="Document" ma:contentTypeID="0x01010079F111ED35F8CC479449609E8A0923A6" ma:contentTypeVersion="28" ma:contentTypeDescription="Create a new document." ma:contentTypeScope="" ma:versionID="60f5a4f2d2b0abadcf532d48ebf9cb71">
   <xsd:schema xmlns:xsd="http://www.w3.org/2001/XMLSchema" xmlns:xs="http://www.w3.org/2001/XMLSchema" xmlns:p="http://schemas.microsoft.com/office/2006/metadata/properties" xmlns:ns1="http://schemas.microsoft.com/sharepoint/v3" xmlns:ns2="71af3243-3dd4-4a8d-8c0d-dd76da1f02a5" xmlns:ns3="16c05727-aa75-4e4a-9b5f-8a80a1165891" xmlns:ns4="230e9df3-be65-4c73-a93b-d1236ebd677e" targetNamespace="http://schemas.microsoft.com/office/2006/metadata/properties" ma:root="true" ma:fieldsID="7dd78129e6a1811f84807ad11c651531" ns1:_="" ns2:_="" ns3:_="" ns4:_="">
     <xsd:import namespace="http://schemas.microsoft.com/sharepoint/v3"/>
@@ -19953,6 +20398,15 @@
 </ct:contentTypeSchema>
 </file>
 
+<file path=customXml/item3.xml><?xml version="1.0" encoding="utf-8"?>
+<?mso-contentType ?>
+<FormTemplates xmlns="http://schemas.microsoft.com/sharepoint/v3/contenttype/forms">
+  <Display>DocumentLibraryForm</Display>
+  <Edit>DocumentLibraryForm</Edit>
+  <New>DocumentLibraryForm</New>
+</FormTemplates>
+</file>
+
 <file path=customXml/itemProps1.xml><?xml version="1.0" encoding="utf-8"?>
 <ds:datastoreItem xmlns:ds="http://schemas.openxmlformats.org/officeDocument/2006/customXml" ds:itemID="{5A00B2AC-C335-4100-B8B3-2D9F49A72906}">
   <ds:schemaRefs>
@@ -19966,14 +20420,6 @@
 </file>
 
 <file path=customXml/itemProps2.xml><?xml version="1.0" encoding="utf-8"?>
-<ds:datastoreItem xmlns:ds="http://schemas.openxmlformats.org/officeDocument/2006/customXml" ds:itemID="{19D1F84C-D1FD-4B1B-9CFD-8E0D96AC4DF2}">
-  <ds:schemaRefs>
-    <ds:schemaRef ds:uri="http://schemas.microsoft.com/sharepoint/v3/contenttype/forms"/>
-  </ds:schemaRefs>
-</ds:datastoreItem>
-</file>
-
-<file path=customXml/itemProps3.xml><?xml version="1.0" encoding="utf-8"?>
 <ds:datastoreItem xmlns:ds="http://schemas.openxmlformats.org/officeDocument/2006/customXml" ds:itemID="{0037C456-A6DA-4DEE-A3FB-4EC3058FD086}">
   <ds:schemaRefs>
     <ds:schemaRef ds:uri="http://schemas.microsoft.com/office/2006/metadata/contentType"/>
@@ -19994,6 +20440,14 @@
 </ds:datastoreItem>
 </file>
 
+<file path=customXml/itemProps3.xml><?xml version="1.0" encoding="utf-8"?>
+<ds:datastoreItem xmlns:ds="http://schemas.openxmlformats.org/officeDocument/2006/customXml" ds:itemID="{19D1F84C-D1FD-4B1B-9CFD-8E0D96AC4DF2}">
+  <ds:schemaRefs>
+    <ds:schemaRef ds:uri="http://schemas.microsoft.com/sharepoint/v3/contenttype/forms"/>
+  </ds:schemaRefs>
+</ds:datastoreItem>
+</file>
+
 <file path=docMetadata/LabelInfo.xml><?xml version="1.0" encoding="utf-8"?>
 <clbl:labelList xmlns:clbl="http://schemas.microsoft.com/office/2020/mipLabelMetadata"/>
 </file>
</xml_diff>